<commit_message>
Updated for Introduction to Amazon Relational Database Service (RDS)
</commit_message>
<xml_diff>
--- a/IntroductionToAmazonWebServices.pptx
+++ b/IntroductionToAmazonWebServices.pptx
@@ -227,7 +227,7 @@
           <a:p>
             <a:fld id="{77A69791-32B8-9242-B73D-A7A5E1C5223C}" type="datetimeFigureOut">
               <a:rPr lang="en-US" smtClean="0"/>
-              <a:t>4/20/18</a:t>
+              <a:t>5/17/18</a:t>
             </a:fld>
             <a:endParaRPr lang="en-US"/>
           </a:p>
@@ -408,7 +408,7 @@
           <a:p>
             <a:fld id="{D41CC7BF-2005-974E-BF38-8F3EE9A93E51}" type="datetimeFigureOut">
               <a:rPr lang="en-US" smtClean="0"/>
-              <a:t>4/20/18</a:t>
+              <a:t>5/17/18</a:t>
             </a:fld>
             <a:endParaRPr lang="en-US"/>
           </a:p>
@@ -998,7 +998,7 @@
           <a:p>
             <a:fld id="{36A9E9B7-40CA-4444-891B-8D9D357B5843}" type="datetime1">
               <a:rPr lang="en-US" smtClean="0"/>
-              <a:t>4/20/18</a:t>
+              <a:t>5/17/18</a:t>
             </a:fld>
             <a:endParaRPr lang="en-US" dirty="0"/>
           </a:p>
@@ -1289,7 +1289,7 @@
           <a:p>
             <a:fld id="{2389329E-1DDC-1B40-A4AA-507B737BCFA5}" type="datetime1">
               <a:rPr lang="en-US" smtClean="0"/>
-              <a:t>4/20/18</a:t>
+              <a:t>5/17/18</a:t>
             </a:fld>
             <a:endParaRPr lang="en-US" dirty="0"/>
           </a:p>
@@ -1548,7 +1548,7 @@
           <a:p>
             <a:fld id="{ABB9B5A8-3E91-984D-A976-ABC614975B12}" type="datetime1">
               <a:rPr lang="en-US" smtClean="0"/>
-              <a:t>4/20/18</a:t>
+              <a:t>5/17/18</a:t>
             </a:fld>
             <a:endParaRPr lang="en-US" dirty="0"/>
           </a:p>
@@ -2017,7 +2017,7 @@
           <a:p>
             <a:fld id="{755648B9-131C-034E-9D49-28CE68F85786}" type="datetime1">
               <a:rPr lang="en-US" smtClean="0"/>
-              <a:t>4/20/18</a:t>
+              <a:t>5/17/18</a:t>
             </a:fld>
             <a:endParaRPr lang="en-US" dirty="0"/>
           </a:p>
@@ -2197,7 +2197,7 @@
           <a:p>
             <a:fld id="{BE3C2711-C74F-2747-920C-A335A6D43129}" type="datetime1">
               <a:rPr lang="en-US" smtClean="0"/>
-              <a:t>4/20/18</a:t>
+              <a:t>5/17/18</a:t>
             </a:fld>
             <a:endParaRPr lang="en-US" dirty="0"/>
           </a:p>
@@ -2773,7 +2773,7 @@
           <a:p>
             <a:fld id="{3442AE2B-521A-9943-992D-6CCE88B1E06E}" type="datetime1">
               <a:rPr lang="en-US" smtClean="0"/>
-              <a:t>4/20/18</a:t>
+              <a:t>5/17/18</a:t>
             </a:fld>
             <a:endParaRPr lang="en-US" dirty="0"/>
           </a:p>
@@ -3105,7 +3105,7 @@
           <a:p>
             <a:fld id="{62AC9A3F-0B0D-604C-B371-603C50472A75}" type="datetime1">
               <a:rPr lang="en-US" smtClean="0"/>
-              <a:t>4/20/18</a:t>
+              <a:t>5/17/18</a:t>
             </a:fld>
             <a:endParaRPr lang="en-US" dirty="0"/>
           </a:p>
@@ -3280,7 +3280,7 @@
           <a:p>
             <a:fld id="{9A07222E-F600-6842-9DF9-F3F771C46091}" type="datetime1">
               <a:rPr lang="en-US" smtClean="0"/>
-              <a:t>4/20/18</a:t>
+              <a:t>5/17/18</a:t>
             </a:fld>
             <a:endParaRPr lang="en-US" dirty="0"/>
           </a:p>
@@ -3460,7 +3460,7 @@
           <a:p>
             <a:fld id="{BA11B67A-CECF-2642-8775-AA589808EEED}" type="datetime1">
               <a:rPr lang="en-US" smtClean="0"/>
-              <a:t>4/20/18</a:t>
+              <a:t>5/17/18</a:t>
             </a:fld>
             <a:endParaRPr lang="en-US" dirty="0"/>
           </a:p>
@@ -3635,7 +3635,7 @@
           <a:p>
             <a:fld id="{52EE984F-D1D3-804D-A54B-C2715419AE2D}" type="datetime1">
               <a:rPr lang="en-US" smtClean="0"/>
-              <a:t>4/20/18</a:t>
+              <a:t>5/17/18</a:t>
             </a:fld>
             <a:endParaRPr lang="en-US" dirty="0"/>
           </a:p>
@@ -3937,7 +3937,7 @@
           <a:p>
             <a:fld id="{4F3E2FC0-52AB-C247-AED8-C7E17E56C911}" type="datetime1">
               <a:rPr lang="en-US" smtClean="0"/>
-              <a:t>4/20/18</a:t>
+              <a:t>5/17/18</a:t>
             </a:fld>
             <a:endParaRPr lang="en-US" dirty="0"/>
           </a:p>
@@ -4229,7 +4229,7 @@
           <a:p>
             <a:fld id="{010C1F7C-71CF-E24A-BBEE-39F722256B81}" type="datetime1">
               <a:rPr lang="en-US" smtClean="0"/>
-              <a:t>4/20/18</a:t>
+              <a:t>5/17/18</a:t>
             </a:fld>
             <a:endParaRPr lang="en-US" dirty="0"/>
           </a:p>
@@ -4658,7 +4658,7 @@
           <a:p>
             <a:fld id="{C65C1330-B985-FF4A-951C-6A66EDD55D48}" type="datetime1">
               <a:rPr lang="en-US" smtClean="0"/>
-              <a:t>4/20/18</a:t>
+              <a:t>5/17/18</a:t>
             </a:fld>
             <a:endParaRPr lang="en-US" dirty="0"/>
           </a:p>
@@ -4776,7 +4776,7 @@
           <a:p>
             <a:fld id="{0530AE88-6944-F74C-A0E1-50E7E17489DD}" type="datetime1">
               <a:rPr lang="en-US" smtClean="0"/>
-              <a:t>4/20/18</a:t>
+              <a:t>5/17/18</a:t>
             </a:fld>
             <a:endParaRPr lang="en-US" dirty="0"/>
           </a:p>
@@ -4871,7 +4871,7 @@
           <a:p>
             <a:fld id="{B2E50FEE-E14B-DC48-9339-E3636709B54D}" type="datetime1">
               <a:rPr lang="en-US" smtClean="0"/>
-              <a:t>4/20/18</a:t>
+              <a:t>5/17/18</a:t>
             </a:fld>
             <a:endParaRPr lang="en-US" dirty="0"/>
           </a:p>
@@ -5154,7 +5154,7 @@
           <a:p>
             <a:fld id="{D599F3F7-8A17-4B4A-8F77-A4AF6C4202D7}" type="datetime1">
               <a:rPr lang="en-US" smtClean="0"/>
-              <a:t>4/20/18</a:t>
+              <a:t>5/17/18</a:t>
             </a:fld>
             <a:endParaRPr lang="en-US" dirty="0"/>
           </a:p>
@@ -5445,7 +5445,7 @@
           <a:p>
             <a:fld id="{5BC34C32-4137-D948-95D2-F8888DC283DE}" type="datetime1">
               <a:rPr lang="en-US" smtClean="0"/>
-              <a:t>4/20/18</a:t>
+              <a:t>5/17/18</a:t>
             </a:fld>
             <a:endParaRPr lang="en-US" dirty="0"/>
           </a:p>
@@ -5676,7 +5676,7 @@
           <a:p>
             <a:fld id="{6D5CE2D3-58AA-4643-8333-9D89F25C1414}" type="datetime1">
               <a:rPr lang="en-US" smtClean="0"/>
-              <a:t>4/20/18</a:t>
+              <a:t>5/17/18</a:t>
             </a:fld>
             <a:endParaRPr lang="en-US" dirty="0"/>
           </a:p>
@@ -6721,8 +6721,17 @@
           <a:p>
             <a:r>
               <a:rPr lang="en-US" dirty="0"/>
-              <a:t>Amazon EC2 – check back here in 5-7 days</a:t>
-            </a:r>
+              <a:t>Amazon EC2 – Coming Soon</a:t>
+            </a:r>
+          </a:p>
+          <a:p>
+            <a:r>
+              <a:rPr lang="en-US" dirty="0">
+                <a:hlinkClick r:id="rId5"/>
+              </a:rPr>
+              <a:t>Amazon Relational Database Service (RDS)</a:t>
+            </a:r>
+            <a:endParaRPr lang="en-US" dirty="0"/>
           </a:p>
         </p:txBody>
       </p:sp>

</xml_diff>